<commit_message>
remove the id from the pptx
</commit_message>
<xml_diff>
--- a/The Magic Square.pptx
+++ b/The Magic Square.pptx
@@ -207,7 +207,7 @@
           <a:p>
             <a:fld id="{7F0AFE12-56EF-4AE7-8426-F141CBA4E875}" type="datetimeFigureOut">
               <a:rPr lang="en-US" smtClean="0"/>
-              <a:t>5/9/2022</a:t>
+              <a:t>5/11/2022</a:t>
             </a:fld>
             <a:endParaRPr lang="en-US"/>
           </a:p>
@@ -625,7 +625,7 @@
           <a:p>
             <a:fld id="{8C28A28C-4C6A-46EA-90C0-4EE0B89CC5C7}" type="datetimeFigureOut">
               <a:rPr lang="en-US" smtClean="0"/>
-              <a:t>5/9/2022</a:t>
+              <a:t>5/11/2022</a:t>
             </a:fld>
             <a:endParaRPr lang="en-US" dirty="0"/>
           </a:p>
@@ -823,7 +823,7 @@
           <a:p>
             <a:fld id="{8C28A28C-4C6A-46EA-90C0-4EE0B89CC5C7}" type="datetimeFigureOut">
               <a:rPr lang="en-US" smtClean="0"/>
-              <a:t>5/9/2022</a:t>
+              <a:t>5/11/2022</a:t>
             </a:fld>
             <a:endParaRPr lang="en-US"/>
           </a:p>
@@ -1031,7 +1031,7 @@
           <a:p>
             <a:fld id="{8C28A28C-4C6A-46EA-90C0-4EE0B89CC5C7}" type="datetimeFigureOut">
               <a:rPr lang="en-US" smtClean="0"/>
-              <a:t>5/9/2022</a:t>
+              <a:t>5/11/2022</a:t>
             </a:fld>
             <a:endParaRPr lang="en-US"/>
           </a:p>
@@ -1229,7 +1229,7 @@
           <a:p>
             <a:fld id="{8C28A28C-4C6A-46EA-90C0-4EE0B89CC5C7}" type="datetimeFigureOut">
               <a:rPr lang="en-US" smtClean="0"/>
-              <a:t>5/9/2022</a:t>
+              <a:t>5/11/2022</a:t>
             </a:fld>
             <a:endParaRPr lang="en-US"/>
           </a:p>
@@ -1506,7 +1506,7 @@
           <a:p>
             <a:fld id="{8C28A28C-4C6A-46EA-90C0-4EE0B89CC5C7}" type="datetimeFigureOut">
               <a:rPr lang="en-US" smtClean="0"/>
-              <a:t>5/9/2022</a:t>
+              <a:t>5/11/2022</a:t>
             </a:fld>
             <a:endParaRPr lang="en-US"/>
           </a:p>
@@ -1771,7 +1771,7 @@
           <a:p>
             <a:fld id="{8C28A28C-4C6A-46EA-90C0-4EE0B89CC5C7}" type="datetimeFigureOut">
               <a:rPr lang="en-US" smtClean="0"/>
-              <a:t>5/9/2022</a:t>
+              <a:t>5/11/2022</a:t>
             </a:fld>
             <a:endParaRPr lang="en-US"/>
           </a:p>
@@ -2183,7 +2183,7 @@
           <a:p>
             <a:fld id="{8C28A28C-4C6A-46EA-90C0-4EE0B89CC5C7}" type="datetimeFigureOut">
               <a:rPr lang="en-US" smtClean="0"/>
-              <a:t>5/9/2022</a:t>
+              <a:t>5/11/2022</a:t>
             </a:fld>
             <a:endParaRPr lang="en-US"/>
           </a:p>
@@ -2324,7 +2324,7 @@
           <a:p>
             <a:fld id="{8C28A28C-4C6A-46EA-90C0-4EE0B89CC5C7}" type="datetimeFigureOut">
               <a:rPr lang="en-US" smtClean="0"/>
-              <a:t>5/9/2022</a:t>
+              <a:t>5/11/2022</a:t>
             </a:fld>
             <a:endParaRPr lang="en-US"/>
           </a:p>
@@ -2437,7 +2437,7 @@
           <a:p>
             <a:fld id="{8C28A28C-4C6A-46EA-90C0-4EE0B89CC5C7}" type="datetimeFigureOut">
               <a:rPr lang="en-US" smtClean="0"/>
-              <a:t>5/9/2022</a:t>
+              <a:t>5/11/2022</a:t>
             </a:fld>
             <a:endParaRPr lang="en-US"/>
           </a:p>
@@ -2750,7 +2750,7 @@
           <a:p>
             <a:fld id="{8C28A28C-4C6A-46EA-90C0-4EE0B89CC5C7}" type="datetimeFigureOut">
               <a:rPr lang="en-US" smtClean="0"/>
-              <a:t>5/9/2022</a:t>
+              <a:t>5/11/2022</a:t>
             </a:fld>
             <a:endParaRPr lang="en-US"/>
           </a:p>
@@ -3038,7 +3038,7 @@
           <a:p>
             <a:fld id="{8C28A28C-4C6A-46EA-90C0-4EE0B89CC5C7}" type="datetimeFigureOut">
               <a:rPr lang="en-US" smtClean="0"/>
-              <a:t>5/9/2022</a:t>
+              <a:t>5/11/2022</a:t>
             </a:fld>
             <a:endParaRPr lang="en-US"/>
           </a:p>
@@ -3393,7 +3393,7 @@
             <a:fld id="{8C28A28C-4C6A-46EA-90C0-4EE0B89CC5C7}" type="datetimeFigureOut">
               <a:rPr lang="en-US" smtClean="0"/>
               <a:pPr/>
-              <a:t>5/9/2022</a:t>
+              <a:t>5/11/2022</a:t>
             </a:fld>
             <a:endParaRPr lang="en-US" dirty="0"/>
           </a:p>
@@ -3942,7 +3942,7 @@
               <a:rPr lang="en-US" sz="2200" dirty="0">
                 <a:latin typeface="Arial Rounded MT Bold" panose="020F0704030504030204" pitchFamily="34" charset="0"/>
               </a:rPr>
-              <a:t>202036900</a:t>
+              <a:t>2020XXXXX</a:t>
             </a:r>
           </a:p>
         </p:txBody>
@@ -4270,7 +4270,7 @@
               <a:rPr lang="en-US" sz="2200" dirty="0">
                 <a:latin typeface="Arial Rounded MT Bold" panose="020F0704030504030204" pitchFamily="34" charset="0"/>
               </a:rPr>
-              <a:t>202032080</a:t>
+              <a:t>2020XXXXXX</a:t>
             </a:r>
           </a:p>
         </p:txBody>

</xml_diff>